<commit_message>
changes to production model example
</commit_message>
<xml_diff>
--- a/Cod_1_Production/Compare_scenarios.pptx
+++ b/Cod_1_Production/Compare_scenarios.pptx
@@ -104,6 +104,11 @@
       </a:defRPr>
     </a:lvl9pPr>
   </p:defaultTextStyle>
+  <p:extLst>
+    <p:ext uri="{EFAFB233-063F-42B5-8137-9DF3F51BA10A}">
+      <p15:sldGuideLst xmlns:p15="http://schemas.microsoft.com/office/powerpoint/2012/main"/>
+    </p:ext>
+  </p:extLst>
 </p:presentation>
 </file>
 
@@ -238,7 +243,7 @@
           <a:p>
             <a:fld id="{DC92E3E9-8981-4A90-9106-3BC1CCC1F23A}" type="datetimeFigureOut">
               <a:rPr lang="en-US" smtClean="0"/>
-              <a:t>11/15/2017</a:t>
+              <a:t>11/16/2017</a:t>
             </a:fld>
             <a:endParaRPr lang="en-US"/>
           </a:p>
@@ -408,7 +413,7 @@
           <a:p>
             <a:fld id="{DC92E3E9-8981-4A90-9106-3BC1CCC1F23A}" type="datetimeFigureOut">
               <a:rPr lang="en-US" smtClean="0"/>
-              <a:t>11/15/2017</a:t>
+              <a:t>11/16/2017</a:t>
             </a:fld>
             <a:endParaRPr lang="en-US"/>
           </a:p>
@@ -588,7 +593,7 @@
           <a:p>
             <a:fld id="{DC92E3E9-8981-4A90-9106-3BC1CCC1F23A}" type="datetimeFigureOut">
               <a:rPr lang="en-US" smtClean="0"/>
-              <a:t>11/15/2017</a:t>
+              <a:t>11/16/2017</a:t>
             </a:fld>
             <a:endParaRPr lang="en-US"/>
           </a:p>
@@ -758,7 +763,7 @@
           <a:p>
             <a:fld id="{DC92E3E9-8981-4A90-9106-3BC1CCC1F23A}" type="datetimeFigureOut">
               <a:rPr lang="en-US" smtClean="0"/>
-              <a:t>11/15/2017</a:t>
+              <a:t>11/16/2017</a:t>
             </a:fld>
             <a:endParaRPr lang="en-US"/>
           </a:p>
@@ -1004,7 +1009,7 @@
           <a:p>
             <a:fld id="{DC92E3E9-8981-4A90-9106-3BC1CCC1F23A}" type="datetimeFigureOut">
               <a:rPr lang="en-US" smtClean="0"/>
-              <a:t>11/15/2017</a:t>
+              <a:t>11/16/2017</a:t>
             </a:fld>
             <a:endParaRPr lang="en-US"/>
           </a:p>
@@ -1236,7 +1241,7 @@
           <a:p>
             <a:fld id="{DC92E3E9-8981-4A90-9106-3BC1CCC1F23A}" type="datetimeFigureOut">
               <a:rPr lang="en-US" smtClean="0"/>
-              <a:t>11/15/2017</a:t>
+              <a:t>11/16/2017</a:t>
             </a:fld>
             <a:endParaRPr lang="en-US"/>
           </a:p>
@@ -1603,7 +1608,7 @@
           <a:p>
             <a:fld id="{DC92E3E9-8981-4A90-9106-3BC1CCC1F23A}" type="datetimeFigureOut">
               <a:rPr lang="en-US" smtClean="0"/>
-              <a:t>11/15/2017</a:t>
+              <a:t>11/16/2017</a:t>
             </a:fld>
             <a:endParaRPr lang="en-US"/>
           </a:p>
@@ -1721,7 +1726,7 @@
           <a:p>
             <a:fld id="{DC92E3E9-8981-4A90-9106-3BC1CCC1F23A}" type="datetimeFigureOut">
               <a:rPr lang="en-US" smtClean="0"/>
-              <a:t>11/15/2017</a:t>
+              <a:t>11/16/2017</a:t>
             </a:fld>
             <a:endParaRPr lang="en-US"/>
           </a:p>
@@ -1816,7 +1821,7 @@
           <a:p>
             <a:fld id="{DC92E3E9-8981-4A90-9106-3BC1CCC1F23A}" type="datetimeFigureOut">
               <a:rPr lang="en-US" smtClean="0"/>
-              <a:t>11/15/2017</a:t>
+              <a:t>11/16/2017</a:t>
             </a:fld>
             <a:endParaRPr lang="en-US"/>
           </a:p>
@@ -2093,7 +2098,7 @@
           <a:p>
             <a:fld id="{DC92E3E9-8981-4A90-9106-3BC1CCC1F23A}" type="datetimeFigureOut">
               <a:rPr lang="en-US" smtClean="0"/>
-              <a:t>11/15/2017</a:t>
+              <a:t>11/16/2017</a:t>
             </a:fld>
             <a:endParaRPr lang="en-US"/>
           </a:p>
@@ -2350,7 +2355,7 @@
           <a:p>
             <a:fld id="{DC92E3E9-8981-4A90-9106-3BC1CCC1F23A}" type="datetimeFigureOut">
               <a:rPr lang="en-US" smtClean="0"/>
-              <a:t>11/15/2017</a:t>
+              <a:t>11/16/2017</a:t>
             </a:fld>
             <a:endParaRPr lang="en-US"/>
           </a:p>
@@ -2563,7 +2568,7 @@
           <a:p>
             <a:fld id="{DC92E3E9-8981-4A90-9106-3BC1CCC1F23A}" type="datetimeFigureOut">
               <a:rPr lang="en-US" smtClean="0"/>
-              <a:t>11/15/2017</a:t>
+              <a:t>11/16/2017</a:t>
             </a:fld>
             <a:endParaRPr lang="en-US"/>
           </a:p>
@@ -2970,27 +2975,27 @@
       </p:grpSpPr>
       <p:pic>
         <p:nvPicPr>
-          <p:cNvPr id="4" name="Picture 3"/>
+          <p:cNvPr id="15" name="Picture 14"/>
           <p:cNvPicPr>
             <a:picLocks noChangeAspect="1"/>
           </p:cNvPicPr>
           <p:nvPr/>
         </p:nvPicPr>
         <p:blipFill rotWithShape="1">
-          <a:blip r:embed="rId2">
+          <a:blip r:embed="rId2" cstate="print">
             <a:extLst>
               <a:ext uri="{28A0092B-C50C-407E-A947-70E740481C1C}">
                 <a14:useLocalDpi xmlns:a14="http://schemas.microsoft.com/office/drawing/2010/main" val="0"/>
               </a:ext>
             </a:extLst>
           </a:blip>
-          <a:srcRect l="18137"/>
+          <a:srcRect l="24335" r="15266"/>
           <a:stretch/>
         </p:blipFill>
         <p:spPr>
           <a:xfrm>
-            <a:off x="5096576" y="159026"/>
-            <a:ext cx="2489752" cy="3041374"/>
+            <a:off x="4950554" y="101008"/>
+            <a:ext cx="2079991" cy="3099392"/>
           </a:xfrm>
           <a:prstGeom prst="rect">
             <a:avLst/>
@@ -2999,27 +3004,27 @@
       </p:pic>
       <p:pic>
         <p:nvPicPr>
-          <p:cNvPr id="5" name="Picture 4"/>
+          <p:cNvPr id="3" name="Picture 2"/>
           <p:cNvPicPr>
             <a:picLocks noChangeAspect="1"/>
           </p:cNvPicPr>
           <p:nvPr/>
         </p:nvPicPr>
         <p:blipFill rotWithShape="1">
-          <a:blip r:embed="rId3">
+          <a:blip r:embed="rId3" cstate="print">
             <a:extLst>
               <a:ext uri="{28A0092B-C50C-407E-A947-70E740481C1C}">
                 <a14:useLocalDpi xmlns:a14="http://schemas.microsoft.com/office/drawing/2010/main" val="0"/>
               </a:ext>
             </a:extLst>
           </a:blip>
-          <a:srcRect l="18112" r="11277"/>
+          <a:srcRect l="24286" r="15764"/>
           <a:stretch/>
         </p:blipFill>
         <p:spPr>
           <a:xfrm>
-            <a:off x="2881427" y="154056"/>
-            <a:ext cx="2151066" cy="3046344"/>
+            <a:off x="2870286" y="101008"/>
+            <a:ext cx="2064824" cy="3099811"/>
           </a:xfrm>
           <a:prstGeom prst="rect">
             <a:avLst/>
@@ -3028,27 +3033,27 @@
       </p:pic>
       <p:pic>
         <p:nvPicPr>
-          <p:cNvPr id="6" name="Picture 5"/>
+          <p:cNvPr id="2" name="Picture 1"/>
           <p:cNvPicPr>
             <a:picLocks noChangeAspect="1"/>
           </p:cNvPicPr>
           <p:nvPr/>
         </p:nvPicPr>
         <p:blipFill rotWithShape="1">
-          <a:blip r:embed="rId4">
+          <a:blip r:embed="rId4" cstate="print">
             <a:extLst>
               <a:ext uri="{28A0092B-C50C-407E-A947-70E740481C1C}">
                 <a14:useLocalDpi xmlns:a14="http://schemas.microsoft.com/office/drawing/2010/main" val="0"/>
               </a:ext>
             </a:extLst>
           </a:blip>
-          <a:srcRect r="10930"/>
+          <a:srcRect r="15760"/>
           <a:stretch/>
         </p:blipFill>
         <p:spPr>
           <a:xfrm>
-            <a:off x="111304" y="154056"/>
-            <a:ext cx="2713383" cy="3046344"/>
+            <a:off x="3459" y="101009"/>
+            <a:ext cx="2851383" cy="3099393"/>
           </a:xfrm>
           <a:prstGeom prst="rect">
             <a:avLst/>
@@ -3063,7 +3068,7 @@
         </p:nvSpPr>
         <p:spPr>
           <a:xfrm>
-            <a:off x="3912781" y="303028"/>
+            <a:off x="3811771" y="303028"/>
             <a:ext cx="1063256" cy="388088"/>
           </a:xfrm>
           <a:prstGeom prst="rect">
@@ -3109,7 +3114,7 @@
         </p:nvSpPr>
         <p:spPr>
           <a:xfrm>
-            <a:off x="6106632" y="303028"/>
+            <a:off x="5888666" y="303028"/>
             <a:ext cx="1063256" cy="388088"/>
           </a:xfrm>
           <a:prstGeom prst="rect">
@@ -3155,7 +3160,7 @@
         </p:nvSpPr>
         <p:spPr>
           <a:xfrm>
-            <a:off x="5126701" y="1557670"/>
+            <a:off x="4972537" y="1520458"/>
             <a:ext cx="1063256" cy="388088"/>
           </a:xfrm>
           <a:prstGeom prst="rect">
@@ -3201,7 +3206,7 @@
         </p:nvSpPr>
         <p:spPr>
           <a:xfrm>
-            <a:off x="2893704" y="1568302"/>
+            <a:off x="2893704" y="1525774"/>
             <a:ext cx="806501" cy="377456"/>
           </a:xfrm>
           <a:prstGeom prst="rect">

</xml_diff>